<commit_message>
Week 6 Soccer Analysis
</commit_message>
<xml_diff>
--- a/week6/MiniProjectKringas.pptx
+++ b/week6/MiniProjectKringas.pptx
@@ -249,6 +249,11 @@
       </a:defRPr>
     </a:lvl9pPr>
   </p:defaultTextStyle>
+  <p:extLst>
+    <p:ext uri="{EFAFB233-063F-42B5-8137-9DF3F51BA10A}">
+      <p15:sldGuideLst xmlns:p15="http://schemas.microsoft.com/office/powerpoint/2012/main"/>
+    </p:ext>
+  </p:extLst>
 </p:presentation>
 </file>
 
@@ -6895,8 +6900,13 @@
           <a:p>
             <a:r>
               <a:rPr lang="en-AU" dirty="0"/>
-              <a:t>Is it more profitable to bet on the favourite, draw, underdog?</a:t>
+              <a:t>Is it more profitable to bet on the home team, draw, </a:t>
             </a:r>
+            <a:r>
+              <a:rPr lang="en-AU"/>
+              <a:t>away team?</a:t>
+            </a:r>
+            <a:endParaRPr lang="en-AU" dirty="0"/>
           </a:p>
           <a:p>
             <a:pPr marL="0" lvl="0" indent="0" algn="l" rtl="0">

</xml_diff>